<commit_message>
Enhance web scraper functionality and documentation
- Updated app.py to include JSON response handling and improved user context injection for better user experience.
- Added new features for exporting scraped data in multiple formats (CSV, JSON, XLSX) with descriptive filenames.
- Introduced code documentation in web_scraper/code_documentation.md for better understanding of the application structure and functionality.
- Created example user setup script (create_example_user.py) for easier testing and demonstration.
- Improved HTML templates for better layout and user interaction, including enhanced forms and error handling.
- Added new static assets (images) and refined CSS for improved styling and user interface consistency.
</commit_message>
<xml_diff>
--- a/docs/Web Scraper .pptx
+++ b/docs/Web Scraper .pptx
@@ -275,7 +275,7 @@
             <a:fld id="{71BDBD2E-87EB-4496-B877-DF3861B7DA12}" type="datetimeFigureOut">
               <a:rPr lang="en-US" smtClean="0"/>
               <a:pPr/>
-              <a:t>2/7/2025</a:t>
+              <a:t>4/10/2025</a:t>
             </a:fld>
             <a:endParaRPr lang="en-US"/>
           </a:p>
@@ -1145,7 +1145,7 @@
             <a:fld id="{71BDBD2E-87EB-4496-B877-DF3861B7DA12}" type="datetimeFigureOut">
               <a:rPr lang="en-US" smtClean="0"/>
               <a:pPr/>
-              <a:t>2/7/2025</a:t>
+              <a:t>4/10/2025</a:t>
             </a:fld>
             <a:endParaRPr lang="en-US"/>
           </a:p>
@@ -1321,7 +1321,7 @@
             <a:fld id="{71BDBD2E-87EB-4496-B877-DF3861B7DA12}" type="datetimeFigureOut">
               <a:rPr lang="en-US" smtClean="0"/>
               <a:pPr/>
-              <a:t>2/7/2025</a:t>
+              <a:t>4/10/2025</a:t>
             </a:fld>
             <a:endParaRPr lang="en-US"/>
           </a:p>
@@ -1529,7 +1529,7 @@
           <a:p>
             <a:fld id="{1D8BD707-D9CF-40AE-B4C6-C98DA3205C09}" type="datetimeFigureOut">
               <a:rPr lang="en-US"/>
-              <a:t>2/7/2025</a:t>
+              <a:t>4/10/2025</a:t>
             </a:fld>
             <a:endParaRPr lang="en-US"/>
           </a:p>
@@ -1721,7 +1721,7 @@
           <a:p>
             <a:fld id="{1D8BD707-D9CF-40AE-B4C6-C98DA3205C09}" type="datetimeFigureOut">
               <a:rPr lang="en-US"/>
-              <a:t>2/7/2025</a:t>
+              <a:t>4/10/2025</a:t>
             </a:fld>
             <a:endParaRPr lang="en-US"/>
           </a:p>
@@ -1945,7 +1945,7 @@
           <a:p>
             <a:fld id="{1D8BD707-D9CF-40AE-B4C6-C98DA3205C09}" type="datetimeFigureOut">
               <a:rPr lang="en-US"/>
-              <a:t>2/7/2025</a:t>
+              <a:t>4/10/2025</a:t>
             </a:fld>
             <a:endParaRPr lang="en-US"/>
           </a:p>
@@ -2227,7 +2227,7 @@
           <a:p>
             <a:fld id="{1D8BD707-D9CF-40AE-B4C6-C98DA3205C09}" type="datetimeFigureOut">
               <a:rPr lang="en-US"/>
-              <a:t>2/7/2025</a:t>
+              <a:t>4/10/2025</a:t>
             </a:fld>
             <a:endParaRPr lang="en-US"/>
           </a:p>
@@ -2351,7 +2351,7 @@
           <a:p>
             <a:fld id="{1D8BD707-D9CF-40AE-B4C6-C98DA3205C09}" type="datetimeFigureOut">
               <a:rPr lang="en-US"/>
-              <a:t>2/7/2025</a:t>
+              <a:t>4/10/2025</a:t>
             </a:fld>
             <a:endParaRPr lang="en-US"/>
           </a:p>
@@ -2516,7 +2516,7 @@
             <a:fld id="{71BDBD2E-87EB-4496-B877-DF3861B7DA12}" type="datetimeFigureOut">
               <a:rPr lang="en-US" smtClean="0"/>
               <a:pPr/>
-              <a:t>2/7/2025</a:t>
+              <a:t>4/10/2025</a:t>
             </a:fld>
             <a:endParaRPr lang="en-US"/>
           </a:p>
@@ -2727,7 +2727,7 @@
             <a:fld id="{71BDBD2E-87EB-4496-B877-DF3861B7DA12}" type="datetimeFigureOut">
               <a:rPr lang="en-US" smtClean="0"/>
               <a:pPr/>
-              <a:t>2/7/2025</a:t>
+              <a:t>4/10/2025</a:t>
             </a:fld>
             <a:endParaRPr lang="en-US"/>
           </a:p>
@@ -3542,7 +3542,7 @@
             <a:fld id="{71BDBD2E-87EB-4496-B877-DF3861B7DA12}" type="datetimeFigureOut">
               <a:rPr lang="en-US" smtClean="0"/>
               <a:pPr/>
-              <a:t>2/7/2025</a:t>
+              <a:t>4/10/2025</a:t>
             </a:fld>
             <a:endParaRPr lang="en-US"/>
           </a:p>
@@ -3779,7 +3779,7 @@
             <a:fld id="{71BDBD2E-87EB-4496-B877-DF3861B7DA12}" type="datetimeFigureOut">
               <a:rPr lang="en-US" smtClean="0"/>
               <a:pPr/>
-              <a:t>2/7/2025</a:t>
+              <a:t>4/10/2025</a:t>
             </a:fld>
             <a:endParaRPr lang="en-US"/>
           </a:p>
@@ -4103,7 +4103,7 @@
             <a:fld id="{71BDBD2E-87EB-4496-B877-DF3861B7DA12}" type="datetimeFigureOut">
               <a:rPr lang="en-US" smtClean="0"/>
               <a:pPr/>
-              <a:t>2/7/2025</a:t>
+              <a:t>4/10/2025</a:t>
             </a:fld>
             <a:endParaRPr lang="en-US"/>
           </a:p>
@@ -4195,7 +4195,7 @@
             <a:fld id="{71BDBD2E-87EB-4496-B877-DF3861B7DA12}" type="datetimeFigureOut">
               <a:rPr lang="en-US" smtClean="0"/>
               <a:pPr/>
-              <a:t>2/7/2025</a:t>
+              <a:t>4/10/2025</a:t>
             </a:fld>
             <a:endParaRPr lang="en-US"/>
           </a:p>
@@ -4713,7 +4713,7 @@
             <a:fld id="{71BDBD2E-87EB-4496-B877-DF3861B7DA12}" type="datetimeFigureOut">
               <a:rPr lang="en-US" smtClean="0"/>
               <a:pPr/>
-              <a:t>2/7/2025</a:t>
+              <a:t>4/10/2025</a:t>
             </a:fld>
             <a:endParaRPr lang="en-US"/>
           </a:p>
@@ -5225,7 +5225,7 @@
             <a:fld id="{71BDBD2E-87EB-4496-B877-DF3861B7DA12}" type="datetimeFigureOut">
               <a:rPr lang="en-US" smtClean="0"/>
               <a:pPr/>
-              <a:t>2/7/2025</a:t>
+              <a:t>4/10/2025</a:t>
             </a:fld>
             <a:endParaRPr lang="en-US"/>
           </a:p>
@@ -5470,7 +5470,7 @@
             <a:fld id="{71BDBD2E-87EB-4496-B877-DF3861B7DA12}" type="datetimeFigureOut">
               <a:rPr lang="en-US" smtClean="0"/>
               <a:pPr/>
-              <a:t>2/7/2025</a:t>
+              <a:t>4/10/2025</a:t>
             </a:fld>
             <a:endParaRPr lang="en-US"/>
           </a:p>
@@ -6238,7 +6238,7 @@
           <a:p>
             <a:fld id="{1D8BD707-D9CF-40AE-B4C6-C98DA3205C09}" type="datetimeFigureOut">
               <a:rPr lang="en-US"/>
-              <a:t>2/7/2025</a:t>
+              <a:t>4/10/2025</a:t>
             </a:fld>
             <a:endParaRPr lang="en-US"/>
           </a:p>
@@ -9246,8 +9246,12 @@
               <a:buNone/>
             </a:pPr>
             <a:r>
+              <a:rPr lang="en-IN"/>
+              <a:t>Flask: </a:t>
+            </a:r>
+            <a:r>
               <a:rPr lang="en-IN" dirty="0"/>
-              <a:t>Flask/Django: For web-based</a:t>
+              <a:t>For web-based</a:t>
             </a:r>
           </a:p>
           <a:p>

</xml_diff>

<commit_message>
Update README.md to include full names of contributors and modify project documentation
- Updated the "Made with ❤️ by Shivam" section to include full names: Shivam Yadav & Shubham Panwar.
- Made changes to the web scraper documentation, removing unnecessary content and streamlining the company profile section.
- Deleted the outdated presentation file for web scraping projects.
</commit_message>
<xml_diff>
--- a/docs/Web Scraper .pptx
+++ b/docs/Web Scraper .pptx
@@ -275,7 +275,7 @@
             <a:fld id="{71BDBD2E-87EB-4496-B877-DF3861B7DA12}" type="datetimeFigureOut">
               <a:rPr lang="en-US" smtClean="0"/>
               <a:pPr/>
-              <a:t>4/10/2025</a:t>
+              <a:t>4/15/2025</a:t>
             </a:fld>
             <a:endParaRPr lang="en-US"/>
           </a:p>
@@ -1145,7 +1145,7 @@
             <a:fld id="{71BDBD2E-87EB-4496-B877-DF3861B7DA12}" type="datetimeFigureOut">
               <a:rPr lang="en-US" smtClean="0"/>
               <a:pPr/>
-              <a:t>4/10/2025</a:t>
+              <a:t>4/15/2025</a:t>
             </a:fld>
             <a:endParaRPr lang="en-US"/>
           </a:p>
@@ -1321,7 +1321,7 @@
             <a:fld id="{71BDBD2E-87EB-4496-B877-DF3861B7DA12}" type="datetimeFigureOut">
               <a:rPr lang="en-US" smtClean="0"/>
               <a:pPr/>
-              <a:t>4/10/2025</a:t>
+              <a:t>4/15/2025</a:t>
             </a:fld>
             <a:endParaRPr lang="en-US"/>
           </a:p>
@@ -1529,7 +1529,7 @@
           <a:p>
             <a:fld id="{1D8BD707-D9CF-40AE-B4C6-C98DA3205C09}" type="datetimeFigureOut">
               <a:rPr lang="en-US"/>
-              <a:t>4/10/2025</a:t>
+              <a:t>4/15/2025</a:t>
             </a:fld>
             <a:endParaRPr lang="en-US"/>
           </a:p>
@@ -1721,7 +1721,7 @@
           <a:p>
             <a:fld id="{1D8BD707-D9CF-40AE-B4C6-C98DA3205C09}" type="datetimeFigureOut">
               <a:rPr lang="en-US"/>
-              <a:t>4/10/2025</a:t>
+              <a:t>4/15/2025</a:t>
             </a:fld>
             <a:endParaRPr lang="en-US"/>
           </a:p>
@@ -1945,7 +1945,7 @@
           <a:p>
             <a:fld id="{1D8BD707-D9CF-40AE-B4C6-C98DA3205C09}" type="datetimeFigureOut">
               <a:rPr lang="en-US"/>
-              <a:t>4/10/2025</a:t>
+              <a:t>4/15/2025</a:t>
             </a:fld>
             <a:endParaRPr lang="en-US"/>
           </a:p>
@@ -2227,7 +2227,7 @@
           <a:p>
             <a:fld id="{1D8BD707-D9CF-40AE-B4C6-C98DA3205C09}" type="datetimeFigureOut">
               <a:rPr lang="en-US"/>
-              <a:t>4/10/2025</a:t>
+              <a:t>4/15/2025</a:t>
             </a:fld>
             <a:endParaRPr lang="en-US"/>
           </a:p>
@@ -2351,7 +2351,7 @@
           <a:p>
             <a:fld id="{1D8BD707-D9CF-40AE-B4C6-C98DA3205C09}" type="datetimeFigureOut">
               <a:rPr lang="en-US"/>
-              <a:t>4/10/2025</a:t>
+              <a:t>4/15/2025</a:t>
             </a:fld>
             <a:endParaRPr lang="en-US"/>
           </a:p>
@@ -2516,7 +2516,7 @@
             <a:fld id="{71BDBD2E-87EB-4496-B877-DF3861B7DA12}" type="datetimeFigureOut">
               <a:rPr lang="en-US" smtClean="0"/>
               <a:pPr/>
-              <a:t>4/10/2025</a:t>
+              <a:t>4/15/2025</a:t>
             </a:fld>
             <a:endParaRPr lang="en-US"/>
           </a:p>
@@ -2727,7 +2727,7 @@
             <a:fld id="{71BDBD2E-87EB-4496-B877-DF3861B7DA12}" type="datetimeFigureOut">
               <a:rPr lang="en-US" smtClean="0"/>
               <a:pPr/>
-              <a:t>4/10/2025</a:t>
+              <a:t>4/15/2025</a:t>
             </a:fld>
             <a:endParaRPr lang="en-US"/>
           </a:p>
@@ -3542,7 +3542,7 @@
             <a:fld id="{71BDBD2E-87EB-4496-B877-DF3861B7DA12}" type="datetimeFigureOut">
               <a:rPr lang="en-US" smtClean="0"/>
               <a:pPr/>
-              <a:t>4/10/2025</a:t>
+              <a:t>4/15/2025</a:t>
             </a:fld>
             <a:endParaRPr lang="en-US"/>
           </a:p>
@@ -3779,7 +3779,7 @@
             <a:fld id="{71BDBD2E-87EB-4496-B877-DF3861B7DA12}" type="datetimeFigureOut">
               <a:rPr lang="en-US" smtClean="0"/>
               <a:pPr/>
-              <a:t>4/10/2025</a:t>
+              <a:t>4/15/2025</a:t>
             </a:fld>
             <a:endParaRPr lang="en-US"/>
           </a:p>
@@ -4103,7 +4103,7 @@
             <a:fld id="{71BDBD2E-87EB-4496-B877-DF3861B7DA12}" type="datetimeFigureOut">
               <a:rPr lang="en-US" smtClean="0"/>
               <a:pPr/>
-              <a:t>4/10/2025</a:t>
+              <a:t>4/15/2025</a:t>
             </a:fld>
             <a:endParaRPr lang="en-US"/>
           </a:p>
@@ -4195,7 +4195,7 @@
             <a:fld id="{71BDBD2E-87EB-4496-B877-DF3861B7DA12}" type="datetimeFigureOut">
               <a:rPr lang="en-US" smtClean="0"/>
               <a:pPr/>
-              <a:t>4/10/2025</a:t>
+              <a:t>4/15/2025</a:t>
             </a:fld>
             <a:endParaRPr lang="en-US"/>
           </a:p>
@@ -4713,7 +4713,7 @@
             <a:fld id="{71BDBD2E-87EB-4496-B877-DF3861B7DA12}" type="datetimeFigureOut">
               <a:rPr lang="en-US" smtClean="0"/>
               <a:pPr/>
-              <a:t>4/10/2025</a:t>
+              <a:t>4/15/2025</a:t>
             </a:fld>
             <a:endParaRPr lang="en-US"/>
           </a:p>
@@ -5225,7 +5225,7 @@
             <a:fld id="{71BDBD2E-87EB-4496-B877-DF3861B7DA12}" type="datetimeFigureOut">
               <a:rPr lang="en-US" smtClean="0"/>
               <a:pPr/>
-              <a:t>4/10/2025</a:t>
+              <a:t>4/15/2025</a:t>
             </a:fld>
             <a:endParaRPr lang="en-US"/>
           </a:p>
@@ -5470,7 +5470,7 @@
             <a:fld id="{71BDBD2E-87EB-4496-B877-DF3861B7DA12}" type="datetimeFigureOut">
               <a:rPr lang="en-US" smtClean="0"/>
               <a:pPr/>
-              <a:t>4/10/2025</a:t>
+              <a:t>4/15/2025</a:t>
             </a:fld>
             <a:endParaRPr lang="en-US"/>
           </a:p>
@@ -6238,7 +6238,7 @@
           <a:p>
             <a:fld id="{1D8BD707-D9CF-40AE-B4C6-C98DA3205C09}" type="datetimeFigureOut">
               <a:rPr lang="en-US"/>
-              <a:t>4/10/2025</a:t>
+              <a:t>4/15/2025</a:t>
             </a:fld>
             <a:endParaRPr lang="en-US"/>
           </a:p>
@@ -6474,7 +6474,7 @@
         </p:nvSpPr>
         <p:spPr>
           <a:xfrm>
-            <a:off x="609600" y="304800"/>
+            <a:off x="1043608" y="2286000"/>
             <a:ext cx="7772400" cy="1829761"/>
           </a:xfrm>
         </p:spPr>
@@ -6523,54 +6523,11 @@
           </a:p>
           <a:p>
             <a:pPr algn="ctr"/>
-            <a:r>
-              <a:rPr lang="en-US" sz="2600" dirty="0"/>
-              <a:t>Parul Institute of Computer Applications</a:t>
-            </a:r>
-          </a:p>
-          <a:p>
-            <a:pPr algn="ctr"/>
-            <a:r>
-              <a:rPr lang="en-US" sz="2800" dirty="0"/>
-              <a:t>Semester 6 Project</a:t>
-            </a:r>
-          </a:p>
-          <a:p>
-            <a:pPr algn="ctr"/>
             <a:endParaRPr lang="en-US" sz="2800" dirty="0"/>
-          </a:p>
-          <a:p>
-            <a:pPr algn="ctr"/>
-            <a:r>
-              <a:rPr lang="en-US" sz="2400" dirty="0"/>
-              <a:t>2024-25</a:t>
-            </a:r>
           </a:p>
           <a:p>
             <a:pPr algn="ctr"/>
             <a:endParaRPr lang="en-US" sz="2400" dirty="0"/>
-          </a:p>
-          <a:p>
-            <a:pPr algn="ctr"/>
-            <a:r>
-              <a:rPr lang="en-US" sz="2600" dirty="0"/>
-              <a:t>Shivam Yadav (220510110097)</a:t>
-            </a:r>
-          </a:p>
-          <a:p>
-            <a:pPr algn="ctr"/>
-            <a:r>
-              <a:rPr lang="en-US" sz="2600" dirty="0"/>
-              <a:t>Shubham Panwar (2205101130099)</a:t>
-            </a:r>
-          </a:p>
-          <a:p>
-            <a:pPr algn="ctr"/>
-            <a:endParaRPr lang="en-US" sz="2000" dirty="0"/>
-          </a:p>
-          <a:p>
-            <a:pPr algn="ctr"/>
-            <a:endParaRPr lang="en-US" sz="2000" dirty="0"/>
           </a:p>
           <a:p>
             <a:pPr algn="l"/>

</xml_diff>